<commit_message>
Updated Word and presentation
</commit_message>
<xml_diff>
--- a/DBS211_Presentation_Group4.pptx
+++ b/DBS211_Presentation_Group4.pptx
@@ -8179,8 +8179,8 @@
         </p:nvSpPr>
         <p:spPr>
           <a:xfrm>
-            <a:off x="1" y="1276756"/>
-            <a:ext cx="7592784" cy="3693319"/>
+            <a:off x="1" y="958692"/>
+            <a:ext cx="7592784" cy="5025671"/>
           </a:xfrm>
           <a:prstGeom prst="rect">
             <a:avLst/>
@@ -8193,79 +8193,90 @@
           </a:bodyPr>
           <a:lstStyle/>
           <a:p>
+            <a:pPr>
+              <a:lnSpc>
+                <a:spcPct val="150000"/>
+              </a:lnSpc>
+            </a:pPr>
             <a:r>
               <a:rPr lang="en-US" dirty="0"/>
               <a:t>The Hospital Management System database consists of several interconnected tables to efficiently manage hospital operations:</a:t>
             </a:r>
           </a:p>
           <a:p>
-            <a:pPr marL="285750" indent="-285750">
-              <a:buFontTx/>
-              <a:buChar char="-"/>
+            <a:pPr>
+              <a:lnSpc>
+                <a:spcPct val="150000"/>
+              </a:lnSpc>
             </a:pPr>
             <a:r>
               <a:rPr lang="en-US" dirty="0"/>
-              <a:t>The Patients table stores personal and contact information of patients. </a:t>
-            </a:r>
-          </a:p>
-          <a:p>
-            <a:pPr marL="285750" indent="-285750">
-              <a:buFontTx/>
-              <a:buChar char="-"/>
+              <a:t>- The Patients table stores personal and contact information of patients. </a:t>
+            </a:r>
+          </a:p>
+          <a:p>
+            <a:pPr>
+              <a:lnSpc>
+                <a:spcPct val="150000"/>
+              </a:lnSpc>
             </a:pPr>
             <a:r>
               <a:rPr lang="en-US" dirty="0"/>
-              <a:t>The Doctors table holds professional details of doctors. </a:t>
-            </a:r>
-          </a:p>
-          <a:p>
-            <a:pPr marL="285750" indent="-285750">
-              <a:buFontTx/>
-              <a:buChar char="-"/>
+              <a:t>- The Doctors table holds professional details of doctors. </a:t>
+            </a:r>
+          </a:p>
+          <a:p>
+            <a:pPr>
+              <a:lnSpc>
+                <a:spcPct val="150000"/>
+              </a:lnSpc>
             </a:pPr>
             <a:r>
               <a:rPr lang="en-US" dirty="0"/>
-              <a:t>The Appointments table manages patient-doctor appointments, linking to the Patients and Doctors tables through foreign keys. </a:t>
-            </a:r>
-          </a:p>
-          <a:p>
-            <a:pPr marL="285750" indent="-285750">
-              <a:buFontTx/>
-              <a:buChar char="-"/>
+              <a:t>- The Appointments table manages patient-doctor appointments, linking to the Patients and Doctors tables through foreign keys. </a:t>
+            </a:r>
+          </a:p>
+          <a:p>
+            <a:pPr>
+              <a:lnSpc>
+                <a:spcPct val="150000"/>
+              </a:lnSpc>
             </a:pPr>
             <a:r>
               <a:rPr lang="en-US" dirty="0"/>
-              <a:t>The Records table stores medical visit details, including diagnosis and treatment, also linked to Patients and Doctors. </a:t>
-            </a:r>
-          </a:p>
-          <a:p>
-            <a:pPr marL="285750" indent="-285750">
-              <a:buFontTx/>
-              <a:buChar char="-"/>
+              <a:t>- The Records table stores medical visit details, including diagnosis and treatment, also linked to Patients and Doctors. </a:t>
+            </a:r>
+          </a:p>
+          <a:p>
+            <a:pPr>
+              <a:lnSpc>
+                <a:spcPct val="150000"/>
+              </a:lnSpc>
             </a:pPr>
             <a:r>
               <a:rPr lang="en-US" dirty="0"/>
-              <a:t>The Billing table handles billing information, associating appointments with payment details and patient information. </a:t>
-            </a:r>
-          </a:p>
-          <a:p>
-            <a:pPr marL="285750" indent="-285750">
-              <a:buFontTx/>
-              <a:buChar char="-"/>
+              <a:t>- The Billing table handles billing information, associating appointments with payment details and patient information. </a:t>
+            </a:r>
+          </a:p>
+          <a:p>
+            <a:pPr>
+              <a:lnSpc>
+                <a:spcPct val="150000"/>
+              </a:lnSpc>
             </a:pPr>
             <a:r>
               <a:rPr lang="en-US" dirty="0"/>
-              <a:t>The Doctors_Schedules table manages doctors' availability. </a:t>
+              <a:t>- The Doctors_Schedules table manages doctors' availability. </a:t>
             </a:r>
           </a:p>
         </p:txBody>
       </p:sp>
       <p:pic>
         <p:nvPicPr>
-          <p:cNvPr id="7" name="Picture 1" descr="A diagram of a patient schedule&#10;&#10;Description automatically generated with medium confidence">
+          <p:cNvPr id="3" name="Picture 1" descr="A diagram of a patient schedule&#10;&#10;Description automatically generated with medium confidence">
             <a:extLst>
               <a:ext uri="{FF2B5EF4-FFF2-40B4-BE49-F238E27FC236}">
-                <a16:creationId xmlns:a16="http://schemas.microsoft.com/office/drawing/2014/main" id="{28E19077-FD26-4289-B978-10342C8B6E0F}"/>
+                <a16:creationId xmlns:a16="http://schemas.microsoft.com/office/drawing/2014/main" id="{2CAF371E-3F67-D3A7-7368-6408E7310D59}"/>
               </a:ext>
             </a:extLst>
           </p:cNvPr>
@@ -8280,7 +8291,7 @@
         </p:blipFill>
         <p:spPr>
           <a:xfrm>
-            <a:off x="7592785" y="1352231"/>
+            <a:off x="7592785" y="958692"/>
             <a:ext cx="4504925" cy="3605251"/>
           </a:xfrm>
           <a:prstGeom prst="rect">
@@ -8388,8 +8399,8 @@
         </p:nvSpPr>
         <p:spPr>
           <a:xfrm>
-            <a:off x="94290" y="1305341"/>
-            <a:ext cx="7261411" cy="4247317"/>
+            <a:off x="94290" y="916372"/>
+            <a:ext cx="7892242" cy="5856668"/>
           </a:xfrm>
           <a:prstGeom prst="rect">
             <a:avLst/>
@@ -8402,6 +8413,11 @@
           </a:bodyPr>
           <a:lstStyle/>
           <a:p>
+            <a:pPr>
+              <a:lnSpc>
+                <a:spcPct val="150000"/>
+              </a:lnSpc>
+            </a:pPr>
             <a:r>
               <a:rPr lang="en-US" dirty="0"/>
               <a:t>Relationships Overview: </a:t>
@@ -8409,6 +8425,9 @@
           </a:p>
           <a:p>
             <a:pPr marL="285750" indent="-285750">
+              <a:lnSpc>
+                <a:spcPct val="150000"/>
+              </a:lnSpc>
               <a:buFontTx/>
               <a:buChar char="-"/>
             </a:pPr>
@@ -8419,6 +8438,9 @@
           </a:p>
           <a:p>
             <a:pPr marL="285750" indent="-285750">
+              <a:lnSpc>
+                <a:spcPct val="150000"/>
+              </a:lnSpc>
               <a:buFontTx/>
               <a:buChar char="-"/>
             </a:pPr>
@@ -8429,6 +8451,9 @@
           </a:p>
           <a:p>
             <a:pPr marL="285750" indent="-285750">
+              <a:lnSpc>
+                <a:spcPct val="150000"/>
+              </a:lnSpc>
               <a:buFontTx/>
               <a:buChar char="-"/>
             </a:pPr>
@@ -8439,6 +8464,9 @@
           </a:p>
           <a:p>
             <a:pPr marL="285750" indent="-285750">
+              <a:lnSpc>
+                <a:spcPct val="150000"/>
+              </a:lnSpc>
               <a:buFontTx/>
               <a:buChar char="-"/>
             </a:pPr>
@@ -8449,6 +8477,9 @@
           </a:p>
           <a:p>
             <a:pPr marL="285750" indent="-285750">
+              <a:lnSpc>
+                <a:spcPct val="150000"/>
+              </a:lnSpc>
               <a:buFontTx/>
               <a:buChar char="-"/>
             </a:pPr>
@@ -8459,6 +8490,9 @@
           </a:p>
           <a:p>
             <a:pPr marL="285750" indent="-285750">
+              <a:lnSpc>
+                <a:spcPct val="150000"/>
+              </a:lnSpc>
               <a:buFontTx/>
               <a:buChar char="-"/>
             </a:pPr>
@@ -8469,6 +8503,9 @@
           </a:p>
           <a:p>
             <a:pPr marL="285750" indent="-285750">
+              <a:lnSpc>
+                <a:spcPct val="150000"/>
+              </a:lnSpc>
               <a:buFontTx/>
               <a:buChar char="-"/>
             </a:pPr>
@@ -8499,7 +8536,7 @@
         </p:blipFill>
         <p:spPr>
           <a:xfrm>
-            <a:off x="7592785" y="1352231"/>
+            <a:off x="7592785" y="958648"/>
             <a:ext cx="4504925" cy="3605251"/>
           </a:xfrm>
           <a:prstGeom prst="rect">
@@ -8636,181 +8673,6 @@
       </p:sp>
       <p:grpSp>
         <p:nvGrpSpPr>
-          <p:cNvPr id="6" name="Group 5">
-            <a:extLst>
-              <a:ext uri="{FF2B5EF4-FFF2-40B4-BE49-F238E27FC236}">
-                <a16:creationId xmlns:a16="http://schemas.microsoft.com/office/drawing/2014/main" id="{068B0E7B-E072-B360-36AF-1C35A822653A}"/>
-              </a:ext>
-            </a:extLst>
-          </p:cNvPr>
-          <p:cNvGrpSpPr/>
-          <p:nvPr/>
-        </p:nvGrpSpPr>
-        <p:grpSpPr>
-          <a:xfrm>
-            <a:off x="0" y="1953337"/>
-            <a:ext cx="11806177" cy="729792"/>
-            <a:chOff x="0" y="4283924"/>
-            <a:chExt cx="11806177" cy="729792"/>
-          </a:xfrm>
-        </p:grpSpPr>
-        <p:pic>
-          <p:nvPicPr>
-            <p:cNvPr id="3" name="Picture 2">
-              <a:extLst>
-                <a:ext uri="{FF2B5EF4-FFF2-40B4-BE49-F238E27FC236}">
-                  <a16:creationId xmlns:a16="http://schemas.microsoft.com/office/drawing/2014/main" id="{30DDC4E2-78FE-F1AA-0546-3EA1B8C3F567}"/>
-                </a:ext>
-              </a:extLst>
-            </p:cNvPr>
-            <p:cNvPicPr>
-              <a:picLocks noChangeAspect="1"/>
-            </p:cNvPicPr>
-            <p:nvPr/>
-          </p:nvPicPr>
-          <p:blipFill>
-            <a:blip r:embed="rId3"/>
-            <a:stretch>
-              <a:fillRect/>
-            </a:stretch>
-          </p:blipFill>
-          <p:spPr>
-            <a:xfrm>
-              <a:off x="0" y="4657133"/>
-              <a:ext cx="7772400" cy="356583"/>
-            </a:xfrm>
-            <a:prstGeom prst="rect">
-              <a:avLst/>
-            </a:prstGeom>
-          </p:spPr>
-        </p:pic>
-        <p:sp>
-          <p:nvSpPr>
-            <p:cNvPr id="4" name="TextBox 3">
-              <a:extLst>
-                <a:ext uri="{FF2B5EF4-FFF2-40B4-BE49-F238E27FC236}">
-                  <a16:creationId xmlns:a16="http://schemas.microsoft.com/office/drawing/2014/main" id="{DDC4B293-62D9-1476-C01E-BCADE4BDB7D1}"/>
-                </a:ext>
-              </a:extLst>
-            </p:cNvPr>
-            <p:cNvSpPr txBox="1"/>
-            <p:nvPr/>
-          </p:nvSpPr>
-          <p:spPr>
-            <a:xfrm>
-              <a:off x="1" y="4283924"/>
-              <a:ext cx="11806176" cy="369332"/>
-            </a:xfrm>
-            <a:prstGeom prst="rect">
-              <a:avLst/>
-            </a:prstGeom>
-            <a:noFill/>
-          </p:spPr>
-          <p:txBody>
-            <a:bodyPr wrap="square" rtlCol="0">
-              <a:spAutoFit/>
-            </a:bodyPr>
-            <a:lstStyle/>
-            <a:p>
-              <a:pPr marL="342900" indent="-342900">
-                <a:buAutoNum type="arabicPeriod"/>
-              </a:pPr>
-              <a:r>
-                <a:rPr lang="en-US" dirty="0"/>
-                <a:t>Bob McKenzie, a new patient, arrives at the hospital and provides his personal information to register.</a:t>
-              </a:r>
-            </a:p>
-          </p:txBody>
-        </p:sp>
-      </p:grpSp>
-      <p:grpSp>
-        <p:nvGrpSpPr>
-          <p:cNvPr id="12" name="Group 11">
-            <a:extLst>
-              <a:ext uri="{FF2B5EF4-FFF2-40B4-BE49-F238E27FC236}">
-                <a16:creationId xmlns:a16="http://schemas.microsoft.com/office/drawing/2014/main" id="{B360F51C-11F0-86E8-BA9C-AEC83B41FD6C}"/>
-              </a:ext>
-            </a:extLst>
-          </p:cNvPr>
-          <p:cNvGrpSpPr/>
-          <p:nvPr/>
-        </p:nvGrpSpPr>
-        <p:grpSpPr>
-          <a:xfrm>
-            <a:off x="0" y="3334876"/>
-            <a:ext cx="11343190" cy="892413"/>
-            <a:chOff x="94290" y="5552659"/>
-            <a:chExt cx="11343190" cy="892413"/>
-          </a:xfrm>
-        </p:grpSpPr>
-        <p:sp>
-          <p:nvSpPr>
-            <p:cNvPr id="10" name="TextBox 9">
-              <a:extLst>
-                <a:ext uri="{FF2B5EF4-FFF2-40B4-BE49-F238E27FC236}">
-                  <a16:creationId xmlns:a16="http://schemas.microsoft.com/office/drawing/2014/main" id="{CA48153A-8EAC-E4AB-0AF5-B6AACF34DE2D}"/>
-                </a:ext>
-              </a:extLst>
-            </p:cNvPr>
-            <p:cNvSpPr txBox="1"/>
-            <p:nvPr/>
-          </p:nvSpPr>
-          <p:spPr>
-            <a:xfrm>
-              <a:off x="94290" y="5552659"/>
-              <a:ext cx="11343190" cy="369332"/>
-            </a:xfrm>
-            <a:prstGeom prst="rect">
-              <a:avLst/>
-            </a:prstGeom>
-            <a:noFill/>
-          </p:spPr>
-          <p:txBody>
-            <a:bodyPr wrap="square" rtlCol="0">
-              <a:spAutoFit/>
-            </a:bodyPr>
-            <a:lstStyle/>
-            <a:p>
-              <a:r>
-                <a:rPr lang="en-US" dirty="0"/>
-                <a:t>2. Dr. Alice Brown a cardiologist, is registered in the hospital’s system.</a:t>
-              </a:r>
-            </a:p>
-          </p:txBody>
-        </p:sp>
-        <p:pic>
-          <p:nvPicPr>
-            <p:cNvPr id="11" name="Picture 10">
-              <a:extLst>
-                <a:ext uri="{FF2B5EF4-FFF2-40B4-BE49-F238E27FC236}">
-                  <a16:creationId xmlns:a16="http://schemas.microsoft.com/office/drawing/2014/main" id="{612E2429-B636-2F9B-CB2B-CFE09A6FA0C2}"/>
-                </a:ext>
-              </a:extLst>
-            </p:cNvPr>
-            <p:cNvPicPr>
-              <a:picLocks noChangeAspect="1"/>
-            </p:cNvPicPr>
-            <p:nvPr/>
-          </p:nvPicPr>
-          <p:blipFill>
-            <a:blip r:embed="rId4"/>
-            <a:stretch>
-              <a:fillRect/>
-            </a:stretch>
-          </p:blipFill>
-          <p:spPr>
-            <a:xfrm>
-              <a:off x="94290" y="6048159"/>
-              <a:ext cx="7772400" cy="396913"/>
-            </a:xfrm>
-            <a:prstGeom prst="rect">
-              <a:avLst/>
-            </a:prstGeom>
-          </p:spPr>
-        </p:pic>
-      </p:grpSp>
-      <p:grpSp>
-        <p:nvGrpSpPr>
           <p:cNvPr id="17" name="Group 16">
             <a:extLst>
               <a:ext uri="{FF2B5EF4-FFF2-40B4-BE49-F238E27FC236}">
@@ -8824,9 +8686,9 @@
         <p:grpSpPr>
           <a:xfrm>
             <a:off x="0" y="4949005"/>
-            <a:ext cx="11343190" cy="762870"/>
+            <a:ext cx="11343190" cy="1512481"/>
             <a:chOff x="0" y="5884002"/>
-            <a:chExt cx="11343190" cy="762870"/>
+            <a:chExt cx="11343190" cy="1512481"/>
           </a:xfrm>
         </p:grpSpPr>
         <p:sp>
@@ -8879,6 +8741,125 @@
             <p:nvPr/>
           </p:nvPicPr>
           <p:blipFill>
+            <a:blip r:embed="rId3"/>
+            <a:stretch>
+              <a:fillRect/>
+            </a:stretch>
+          </p:blipFill>
+          <p:spPr>
+            <a:xfrm>
+              <a:off x="94290" y="7002945"/>
+              <a:ext cx="7772400" cy="393538"/>
+            </a:xfrm>
+            <a:prstGeom prst="rect">
+              <a:avLst/>
+            </a:prstGeom>
+          </p:spPr>
+        </p:pic>
+      </p:grpSp>
+      <p:grpSp>
+        <p:nvGrpSpPr>
+          <p:cNvPr id="39" name="Group 38">
+            <a:extLst>
+              <a:ext uri="{FF2B5EF4-FFF2-40B4-BE49-F238E27FC236}">
+                <a16:creationId xmlns:a16="http://schemas.microsoft.com/office/drawing/2014/main" id="{41ACED74-2693-A2FE-9386-FD6746609EBA}"/>
+              </a:ext>
+            </a:extLst>
+          </p:cNvPr>
+          <p:cNvGrpSpPr/>
+          <p:nvPr/>
+        </p:nvGrpSpPr>
+        <p:grpSpPr>
+          <a:xfrm>
+            <a:off x="0" y="1688778"/>
+            <a:ext cx="11806176" cy="1349699"/>
+            <a:chOff x="1" y="1953337"/>
+            <a:chExt cx="11806176" cy="1349699"/>
+          </a:xfrm>
+        </p:grpSpPr>
+        <p:pic>
+          <p:nvPicPr>
+            <p:cNvPr id="3" name="Picture 2">
+              <a:extLst>
+                <a:ext uri="{FF2B5EF4-FFF2-40B4-BE49-F238E27FC236}">
+                  <a16:creationId xmlns:a16="http://schemas.microsoft.com/office/drawing/2014/main" id="{30DDC4E2-78FE-F1AA-0546-3EA1B8C3F567}"/>
+                </a:ext>
+              </a:extLst>
+            </p:cNvPr>
+            <p:cNvPicPr>
+              <a:picLocks noChangeAspect="1"/>
+            </p:cNvPicPr>
+            <p:nvPr/>
+          </p:nvPicPr>
+          <p:blipFill>
+            <a:blip r:embed="rId4"/>
+            <a:stretch>
+              <a:fillRect/>
+            </a:stretch>
+          </p:blipFill>
+          <p:spPr>
+            <a:xfrm>
+              <a:off x="94290" y="2923892"/>
+              <a:ext cx="7846880" cy="360000"/>
+            </a:xfrm>
+            <a:prstGeom prst="rect">
+              <a:avLst/>
+            </a:prstGeom>
+          </p:spPr>
+        </p:pic>
+        <p:sp>
+          <p:nvSpPr>
+            <p:cNvPr id="4" name="TextBox 3">
+              <a:extLst>
+                <a:ext uri="{FF2B5EF4-FFF2-40B4-BE49-F238E27FC236}">
+                  <a16:creationId xmlns:a16="http://schemas.microsoft.com/office/drawing/2014/main" id="{DDC4B293-62D9-1476-C01E-BCADE4BDB7D1}"/>
+                </a:ext>
+              </a:extLst>
+            </p:cNvPr>
+            <p:cNvSpPr txBox="1"/>
+            <p:nvPr/>
+          </p:nvSpPr>
+          <p:spPr>
+            <a:xfrm>
+              <a:off x="1" y="1953337"/>
+              <a:ext cx="11806176" cy="369332"/>
+            </a:xfrm>
+            <a:prstGeom prst="rect">
+              <a:avLst/>
+            </a:prstGeom>
+            <a:noFill/>
+          </p:spPr>
+          <p:txBody>
+            <a:bodyPr wrap="square" rtlCol="0">
+              <a:spAutoFit/>
+            </a:bodyPr>
+            <a:lstStyle/>
+            <a:p>
+              <a:pPr marL="342900" indent="-342900">
+                <a:buAutoNum type="arabicPeriod"/>
+              </a:pPr>
+              <a:r>
+                <a:rPr lang="en-US" dirty="0"/>
+                <a:t>Bob McKenzie, a new patient, arrives at the hospital and provides his personal information to register.</a:t>
+              </a:r>
+            </a:p>
+          </p:txBody>
+        </p:sp>
+        <p:pic>
+          <p:nvPicPr>
+            <p:cNvPr id="7" name="Picture 6">
+              <a:extLst>
+                <a:ext uri="{FF2B5EF4-FFF2-40B4-BE49-F238E27FC236}">
+                  <a16:creationId xmlns:a16="http://schemas.microsoft.com/office/drawing/2014/main" id="{FE374E6E-BF9D-929A-3674-E09007D65AEB}"/>
+                </a:ext>
+              </a:extLst>
+            </p:cNvPr>
+            <p:cNvPicPr>
+              <a:picLocks noChangeAspect="1"/>
+            </p:cNvPicPr>
+            <p:nvPr/>
+          </p:nvPicPr>
+          <p:blipFill>
             <a:blip r:embed="rId5"/>
             <a:stretch>
               <a:fillRect/>
@@ -8886,14 +8867,796 @@
           </p:blipFill>
           <p:spPr>
             <a:xfrm>
-              <a:off x="0" y="6253334"/>
-              <a:ext cx="7772400" cy="393538"/>
+              <a:off x="94290" y="2351225"/>
+              <a:ext cx="7772400" cy="446607"/>
             </a:xfrm>
             <a:prstGeom prst="rect">
               <a:avLst/>
             </a:prstGeom>
           </p:spPr>
         </p:pic>
+        <p:grpSp>
+          <p:nvGrpSpPr>
+            <p:cNvPr id="22" name="Group 21">
+              <a:extLst>
+                <a:ext uri="{FF2B5EF4-FFF2-40B4-BE49-F238E27FC236}">
+                  <a16:creationId xmlns:a16="http://schemas.microsoft.com/office/drawing/2014/main" id="{02FE8DD8-E8B4-181A-08A4-BA7579098C29}"/>
+                </a:ext>
+              </a:extLst>
+            </p:cNvPr>
+            <p:cNvGrpSpPr/>
+            <p:nvPr/>
+          </p:nvGrpSpPr>
+          <p:grpSpPr>
+            <a:xfrm>
+              <a:off x="8014632" y="2386349"/>
+              <a:ext cx="2140370" cy="369332"/>
+              <a:chOff x="8014632" y="2386349"/>
+              <a:chExt cx="2140370" cy="369332"/>
+            </a:xfrm>
+          </p:grpSpPr>
+          <p:sp>
+            <p:nvSpPr>
+              <p:cNvPr id="9" name="TextBox 8">
+                <a:extLst>
+                  <a:ext uri="{FF2B5EF4-FFF2-40B4-BE49-F238E27FC236}">
+                    <a16:creationId xmlns:a16="http://schemas.microsoft.com/office/drawing/2014/main" id="{5FC04700-EE66-EC70-929A-05BAFEA558B2}"/>
+                  </a:ext>
+                </a:extLst>
+              </p:cNvPr>
+              <p:cNvSpPr txBox="1"/>
+              <p:nvPr/>
+            </p:nvSpPr>
+            <p:spPr>
+              <a:xfrm>
+                <a:off x="8691651" y="2386349"/>
+                <a:ext cx="1463351" cy="369332"/>
+              </a:xfrm>
+              <a:prstGeom prst="rect">
+                <a:avLst/>
+              </a:prstGeom>
+              <a:noFill/>
+            </p:spPr>
+            <p:txBody>
+              <a:bodyPr wrap="square" rtlCol="0">
+                <a:spAutoFit/>
+              </a:bodyPr>
+              <a:lstStyle/>
+              <a:p>
+                <a:r>
+                  <a:rPr lang="en-US" dirty="0">
+                    <a:solidFill>
+                      <a:srgbClr val="FFFF00"/>
+                    </a:solidFill>
+                  </a:rPr>
+                  <a:t>Input Data</a:t>
+                </a:r>
+              </a:p>
+            </p:txBody>
+          </p:sp>
+          <p:sp>
+            <p:nvSpPr>
+              <p:cNvPr id="19" name="Right Arrow 18">
+                <a:extLst>
+                  <a:ext uri="{FF2B5EF4-FFF2-40B4-BE49-F238E27FC236}">
+                    <a16:creationId xmlns:a16="http://schemas.microsoft.com/office/drawing/2014/main" id="{C372E5A8-959C-8AFA-4822-AA4F5879F957}"/>
+                  </a:ext>
+                </a:extLst>
+              </p:cNvPr>
+              <p:cNvSpPr/>
+              <p:nvPr/>
+            </p:nvSpPr>
+            <p:spPr>
+              <a:xfrm>
+                <a:off x="8014632" y="2455257"/>
+                <a:ext cx="534109" cy="287729"/>
+              </a:xfrm>
+              <a:prstGeom prst="rightArrow">
+                <a:avLst/>
+              </a:prstGeom>
+            </p:spPr>
+            <p:style>
+              <a:lnRef idx="2">
+                <a:schemeClr val="accent1">
+                  <a:shade val="15000"/>
+                </a:schemeClr>
+              </a:lnRef>
+              <a:fillRef idx="1">
+                <a:schemeClr val="accent1"/>
+              </a:fillRef>
+              <a:effectRef idx="0">
+                <a:schemeClr val="accent1"/>
+              </a:effectRef>
+              <a:fontRef idx="minor">
+                <a:schemeClr val="lt1"/>
+              </a:fontRef>
+            </p:style>
+            <p:txBody>
+              <a:bodyPr rtlCol="0" anchor="ctr"/>
+              <a:lstStyle/>
+              <a:p>
+                <a:pPr algn="ctr"/>
+                <a:endParaRPr lang="en-US" dirty="0"/>
+              </a:p>
+            </p:txBody>
+          </p:sp>
+        </p:grpSp>
+        <p:grpSp>
+          <p:nvGrpSpPr>
+            <p:cNvPr id="25" name="Group 24">
+              <a:extLst>
+                <a:ext uri="{FF2B5EF4-FFF2-40B4-BE49-F238E27FC236}">
+                  <a16:creationId xmlns:a16="http://schemas.microsoft.com/office/drawing/2014/main" id="{7504FAA8-4666-778D-0A89-E2D22AF4F228}"/>
+                </a:ext>
+              </a:extLst>
+            </p:cNvPr>
+            <p:cNvGrpSpPr/>
+            <p:nvPr/>
+          </p:nvGrpSpPr>
+          <p:grpSpPr>
+            <a:xfrm>
+              <a:off x="8014632" y="2933704"/>
+              <a:ext cx="2326173" cy="369332"/>
+              <a:chOff x="8014632" y="2933704"/>
+              <a:chExt cx="2326173" cy="369332"/>
+            </a:xfrm>
+          </p:grpSpPr>
+          <p:sp>
+            <p:nvSpPr>
+              <p:cNvPr id="13" name="TextBox 12">
+                <a:extLst>
+                  <a:ext uri="{FF2B5EF4-FFF2-40B4-BE49-F238E27FC236}">
+                    <a16:creationId xmlns:a16="http://schemas.microsoft.com/office/drawing/2014/main" id="{D8778098-FFE9-5BC9-5A9D-4F3FE9FEAC71}"/>
+                  </a:ext>
+                </a:extLst>
+              </p:cNvPr>
+              <p:cNvSpPr txBox="1"/>
+              <p:nvPr/>
+            </p:nvSpPr>
+            <p:spPr>
+              <a:xfrm>
+                <a:off x="8622203" y="2933704"/>
+                <a:ext cx="1718602" cy="369332"/>
+              </a:xfrm>
+              <a:prstGeom prst="rect">
+                <a:avLst/>
+              </a:prstGeom>
+              <a:noFill/>
+            </p:spPr>
+            <p:txBody>
+              <a:bodyPr wrap="square" rtlCol="0">
+                <a:spAutoFit/>
+              </a:bodyPr>
+              <a:lstStyle/>
+              <a:p>
+                <a:r>
+                  <a:rPr lang="en-US" dirty="0">
+                    <a:solidFill>
+                      <a:srgbClr val="FFFF00"/>
+                    </a:solidFill>
+                  </a:rPr>
+                  <a:t>Output Data</a:t>
+                </a:r>
+              </a:p>
+            </p:txBody>
+          </p:sp>
+          <p:sp>
+            <p:nvSpPr>
+              <p:cNvPr id="24" name="Right Arrow 23">
+                <a:extLst>
+                  <a:ext uri="{FF2B5EF4-FFF2-40B4-BE49-F238E27FC236}">
+                    <a16:creationId xmlns:a16="http://schemas.microsoft.com/office/drawing/2014/main" id="{337546B6-2E65-B2AD-6B8F-5629DE56C7A3}"/>
+                  </a:ext>
+                </a:extLst>
+              </p:cNvPr>
+              <p:cNvSpPr/>
+              <p:nvPr/>
+            </p:nvSpPr>
+            <p:spPr>
+              <a:xfrm>
+                <a:off x="8014632" y="2960027"/>
+                <a:ext cx="534109" cy="287729"/>
+              </a:xfrm>
+              <a:prstGeom prst="rightArrow">
+                <a:avLst/>
+              </a:prstGeom>
+            </p:spPr>
+            <p:style>
+              <a:lnRef idx="2">
+                <a:schemeClr val="accent1">
+                  <a:shade val="15000"/>
+                </a:schemeClr>
+              </a:lnRef>
+              <a:fillRef idx="1">
+                <a:schemeClr val="accent1"/>
+              </a:fillRef>
+              <a:effectRef idx="0">
+                <a:schemeClr val="accent1"/>
+              </a:effectRef>
+              <a:fontRef idx="minor">
+                <a:schemeClr val="lt1"/>
+              </a:fontRef>
+            </p:style>
+            <p:txBody>
+              <a:bodyPr rtlCol="0" anchor="ctr"/>
+              <a:lstStyle/>
+              <a:p>
+                <a:pPr algn="ctr"/>
+                <a:endParaRPr lang="en-US" dirty="0"/>
+              </a:p>
+            </p:txBody>
+          </p:sp>
+        </p:grpSp>
+      </p:grpSp>
+      <p:grpSp>
+        <p:nvGrpSpPr>
+          <p:cNvPr id="40" name="Group 39">
+            <a:extLst>
+              <a:ext uri="{FF2B5EF4-FFF2-40B4-BE49-F238E27FC236}">
+                <a16:creationId xmlns:a16="http://schemas.microsoft.com/office/drawing/2014/main" id="{4D0518A2-2BD1-4BB8-EA18-BC12BB7AD389}"/>
+              </a:ext>
+            </a:extLst>
+          </p:cNvPr>
+          <p:cNvGrpSpPr/>
+          <p:nvPr/>
+        </p:nvGrpSpPr>
+        <p:grpSpPr>
+          <a:xfrm>
+            <a:off x="0" y="3254755"/>
+            <a:ext cx="11343190" cy="1358136"/>
+            <a:chOff x="0" y="3438908"/>
+            <a:chExt cx="11343190" cy="1358136"/>
+          </a:xfrm>
+        </p:grpSpPr>
+        <p:sp>
+          <p:nvSpPr>
+            <p:cNvPr id="10" name="TextBox 9">
+              <a:extLst>
+                <a:ext uri="{FF2B5EF4-FFF2-40B4-BE49-F238E27FC236}">
+                  <a16:creationId xmlns:a16="http://schemas.microsoft.com/office/drawing/2014/main" id="{CA48153A-8EAC-E4AB-0AF5-B6AACF34DE2D}"/>
+                </a:ext>
+              </a:extLst>
+            </p:cNvPr>
+            <p:cNvSpPr txBox="1"/>
+            <p:nvPr/>
+          </p:nvSpPr>
+          <p:spPr>
+            <a:xfrm>
+              <a:off x="0" y="3438908"/>
+              <a:ext cx="11343190" cy="369332"/>
+            </a:xfrm>
+            <a:prstGeom prst="rect">
+              <a:avLst/>
+            </a:prstGeom>
+            <a:noFill/>
+          </p:spPr>
+          <p:txBody>
+            <a:bodyPr wrap="square" rtlCol="0">
+              <a:spAutoFit/>
+            </a:bodyPr>
+            <a:lstStyle/>
+            <a:p>
+              <a:r>
+                <a:rPr lang="en-US" dirty="0"/>
+                <a:t>2. Dr. Alice Brown, a cardiologist, is registered in the hospital’s system.</a:t>
+              </a:r>
+            </a:p>
+          </p:txBody>
+        </p:sp>
+        <p:pic>
+          <p:nvPicPr>
+            <p:cNvPr id="11" name="Picture 10">
+              <a:extLst>
+                <a:ext uri="{FF2B5EF4-FFF2-40B4-BE49-F238E27FC236}">
+                  <a16:creationId xmlns:a16="http://schemas.microsoft.com/office/drawing/2014/main" id="{612E2429-B636-2F9B-CB2B-CFE09A6FA0C2}"/>
+                </a:ext>
+              </a:extLst>
+            </p:cNvPr>
+            <p:cNvPicPr>
+              <a:picLocks noChangeAspect="1"/>
+            </p:cNvPicPr>
+            <p:nvPr/>
+          </p:nvPicPr>
+          <p:blipFill>
+            <a:blip r:embed="rId6"/>
+            <a:stretch>
+              <a:fillRect/>
+            </a:stretch>
+          </p:blipFill>
+          <p:spPr>
+            <a:xfrm>
+              <a:off x="94290" y="4400131"/>
+              <a:ext cx="7772400" cy="396913"/>
+            </a:xfrm>
+            <a:prstGeom prst="rect">
+              <a:avLst/>
+            </a:prstGeom>
+          </p:spPr>
+        </p:pic>
+        <p:pic>
+          <p:nvPicPr>
+            <p:cNvPr id="21" name="Picture 20">
+              <a:extLst>
+                <a:ext uri="{FF2B5EF4-FFF2-40B4-BE49-F238E27FC236}">
+                  <a16:creationId xmlns:a16="http://schemas.microsoft.com/office/drawing/2014/main" id="{388AB49E-B698-0479-3C6D-1F00CEA79C80}"/>
+                </a:ext>
+              </a:extLst>
+            </p:cNvPr>
+            <p:cNvPicPr>
+              <a:picLocks noChangeAspect="1"/>
+            </p:cNvPicPr>
+            <p:nvPr/>
+          </p:nvPicPr>
+          <p:blipFill>
+            <a:blip r:embed="rId7"/>
+            <a:stretch>
+              <a:fillRect/>
+            </a:stretch>
+          </p:blipFill>
+          <p:spPr>
+            <a:xfrm>
+              <a:off x="94290" y="3812054"/>
+              <a:ext cx="5400000" cy="450000"/>
+            </a:xfrm>
+            <a:prstGeom prst="rect">
+              <a:avLst/>
+            </a:prstGeom>
+          </p:spPr>
+        </p:pic>
+        <p:grpSp>
+          <p:nvGrpSpPr>
+            <p:cNvPr id="26" name="Group 25">
+              <a:extLst>
+                <a:ext uri="{FF2B5EF4-FFF2-40B4-BE49-F238E27FC236}">
+                  <a16:creationId xmlns:a16="http://schemas.microsoft.com/office/drawing/2014/main" id="{1DAD2E4E-DEDE-9A8B-664F-4C1F1EB44AFD}"/>
+                </a:ext>
+              </a:extLst>
+            </p:cNvPr>
+            <p:cNvGrpSpPr/>
+            <p:nvPr/>
+          </p:nvGrpSpPr>
+          <p:grpSpPr>
+            <a:xfrm>
+              <a:off x="5671595" y="3846133"/>
+              <a:ext cx="2100805" cy="369332"/>
+              <a:chOff x="8014632" y="2393847"/>
+              <a:chExt cx="2100805" cy="369332"/>
+            </a:xfrm>
+          </p:grpSpPr>
+          <p:sp>
+            <p:nvSpPr>
+              <p:cNvPr id="27" name="TextBox 26">
+                <a:extLst>
+                  <a:ext uri="{FF2B5EF4-FFF2-40B4-BE49-F238E27FC236}">
+                    <a16:creationId xmlns:a16="http://schemas.microsoft.com/office/drawing/2014/main" id="{04526FEA-072D-6ABD-8CC3-558B156FE9AD}"/>
+                  </a:ext>
+                </a:extLst>
+              </p:cNvPr>
+              <p:cNvSpPr txBox="1"/>
+              <p:nvPr/>
+            </p:nvSpPr>
+            <p:spPr>
+              <a:xfrm>
+                <a:off x="8652086" y="2393847"/>
+                <a:ext cx="1463351" cy="369332"/>
+              </a:xfrm>
+              <a:prstGeom prst="rect">
+                <a:avLst/>
+              </a:prstGeom>
+              <a:noFill/>
+            </p:spPr>
+            <p:txBody>
+              <a:bodyPr wrap="square" rtlCol="0">
+                <a:spAutoFit/>
+              </a:bodyPr>
+              <a:lstStyle/>
+              <a:p>
+                <a:r>
+                  <a:rPr lang="en-US" dirty="0">
+                    <a:solidFill>
+                      <a:srgbClr val="FFFF00"/>
+                    </a:solidFill>
+                  </a:rPr>
+                  <a:t>Input Data</a:t>
+                </a:r>
+              </a:p>
+            </p:txBody>
+          </p:sp>
+          <p:sp>
+            <p:nvSpPr>
+              <p:cNvPr id="28" name="Right Arrow 27">
+                <a:extLst>
+                  <a:ext uri="{FF2B5EF4-FFF2-40B4-BE49-F238E27FC236}">
+                    <a16:creationId xmlns:a16="http://schemas.microsoft.com/office/drawing/2014/main" id="{8163C3B2-E7F8-7065-7685-B76EBDBC4D87}"/>
+                  </a:ext>
+                </a:extLst>
+              </p:cNvPr>
+              <p:cNvSpPr/>
+              <p:nvPr/>
+            </p:nvSpPr>
+            <p:spPr>
+              <a:xfrm>
+                <a:off x="8014632" y="2455257"/>
+                <a:ext cx="534109" cy="287729"/>
+              </a:xfrm>
+              <a:prstGeom prst="rightArrow">
+                <a:avLst/>
+              </a:prstGeom>
+            </p:spPr>
+            <p:style>
+              <a:lnRef idx="2">
+                <a:schemeClr val="accent1">
+                  <a:shade val="15000"/>
+                </a:schemeClr>
+              </a:lnRef>
+              <a:fillRef idx="1">
+                <a:schemeClr val="accent1"/>
+              </a:fillRef>
+              <a:effectRef idx="0">
+                <a:schemeClr val="accent1"/>
+              </a:effectRef>
+              <a:fontRef idx="minor">
+                <a:schemeClr val="lt1"/>
+              </a:fontRef>
+            </p:style>
+            <p:txBody>
+              <a:bodyPr rtlCol="0" anchor="ctr"/>
+              <a:lstStyle/>
+              <a:p>
+                <a:pPr algn="ctr"/>
+                <a:endParaRPr lang="en-US" dirty="0"/>
+              </a:p>
+            </p:txBody>
+          </p:sp>
+        </p:grpSp>
+        <p:grpSp>
+          <p:nvGrpSpPr>
+            <p:cNvPr id="29" name="Group 28">
+              <a:extLst>
+                <a:ext uri="{FF2B5EF4-FFF2-40B4-BE49-F238E27FC236}">
+                  <a16:creationId xmlns:a16="http://schemas.microsoft.com/office/drawing/2014/main" id="{A3DEC484-4229-7A4F-23F1-4A9E1ACEC9AB}"/>
+                </a:ext>
+              </a:extLst>
+            </p:cNvPr>
+            <p:cNvGrpSpPr/>
+            <p:nvPr/>
+          </p:nvGrpSpPr>
+          <p:grpSpPr>
+            <a:xfrm>
+              <a:off x="8014632" y="4400131"/>
+              <a:ext cx="2395621" cy="369332"/>
+              <a:chOff x="8014632" y="2931427"/>
+              <a:chExt cx="2395621" cy="369332"/>
+            </a:xfrm>
+          </p:grpSpPr>
+          <p:sp>
+            <p:nvSpPr>
+              <p:cNvPr id="30" name="TextBox 29">
+                <a:extLst>
+                  <a:ext uri="{FF2B5EF4-FFF2-40B4-BE49-F238E27FC236}">
+                    <a16:creationId xmlns:a16="http://schemas.microsoft.com/office/drawing/2014/main" id="{F64111A7-2A4C-1A82-4813-29A71A0CEC04}"/>
+                  </a:ext>
+                </a:extLst>
+              </p:cNvPr>
+              <p:cNvSpPr txBox="1"/>
+              <p:nvPr/>
+            </p:nvSpPr>
+            <p:spPr>
+              <a:xfrm>
+                <a:off x="8691651" y="2931427"/>
+                <a:ext cx="1718602" cy="369332"/>
+              </a:xfrm>
+              <a:prstGeom prst="rect">
+                <a:avLst/>
+              </a:prstGeom>
+              <a:noFill/>
+            </p:spPr>
+            <p:txBody>
+              <a:bodyPr wrap="square" rtlCol="0">
+                <a:spAutoFit/>
+              </a:bodyPr>
+              <a:lstStyle/>
+              <a:p>
+                <a:r>
+                  <a:rPr lang="en-US" dirty="0">
+                    <a:solidFill>
+                      <a:srgbClr val="FFFF00"/>
+                    </a:solidFill>
+                  </a:rPr>
+                  <a:t>Output Data</a:t>
+                </a:r>
+              </a:p>
+            </p:txBody>
+          </p:sp>
+          <p:sp>
+            <p:nvSpPr>
+              <p:cNvPr id="31" name="Right Arrow 30">
+                <a:extLst>
+                  <a:ext uri="{FF2B5EF4-FFF2-40B4-BE49-F238E27FC236}">
+                    <a16:creationId xmlns:a16="http://schemas.microsoft.com/office/drawing/2014/main" id="{929214BC-3419-63BB-A455-7C0FB9BCB617}"/>
+                  </a:ext>
+                </a:extLst>
+              </p:cNvPr>
+              <p:cNvSpPr/>
+              <p:nvPr/>
+            </p:nvSpPr>
+            <p:spPr>
+              <a:xfrm>
+                <a:off x="8014632" y="2960027"/>
+                <a:ext cx="534109" cy="287729"/>
+              </a:xfrm>
+              <a:prstGeom prst="rightArrow">
+                <a:avLst/>
+              </a:prstGeom>
+            </p:spPr>
+            <p:style>
+              <a:lnRef idx="2">
+                <a:schemeClr val="accent1">
+                  <a:shade val="15000"/>
+                </a:schemeClr>
+              </a:lnRef>
+              <a:fillRef idx="1">
+                <a:schemeClr val="accent1"/>
+              </a:fillRef>
+              <a:effectRef idx="0">
+                <a:schemeClr val="accent1"/>
+              </a:effectRef>
+              <a:fontRef idx="minor">
+                <a:schemeClr val="lt1"/>
+              </a:fontRef>
+            </p:style>
+            <p:txBody>
+              <a:bodyPr rtlCol="0" anchor="ctr"/>
+              <a:lstStyle/>
+              <a:p>
+                <a:pPr algn="ctr"/>
+                <a:endParaRPr lang="en-US" dirty="0"/>
+              </a:p>
+            </p:txBody>
+          </p:sp>
+        </p:grpSp>
+      </p:grpSp>
+      <p:pic>
+        <p:nvPicPr>
+          <p:cNvPr id="32" name="Picture 31">
+            <a:extLst>
+              <a:ext uri="{FF2B5EF4-FFF2-40B4-BE49-F238E27FC236}">
+                <a16:creationId xmlns:a16="http://schemas.microsoft.com/office/drawing/2014/main" id="{50AFC446-D0F0-896F-3C4B-EA94750EE4E5}"/>
+              </a:ext>
+            </a:extLst>
+          </p:cNvPr>
+          <p:cNvPicPr>
+            <a:picLocks noChangeAspect="1"/>
+          </p:cNvPicPr>
+          <p:nvPr/>
+        </p:nvPicPr>
+        <p:blipFill>
+          <a:blip r:embed="rId8"/>
+          <a:stretch>
+            <a:fillRect/>
+          </a:stretch>
+        </p:blipFill>
+        <p:spPr>
+          <a:xfrm>
+            <a:off x="94290" y="5429969"/>
+            <a:ext cx="7772400" cy="526347"/>
+          </a:xfrm>
+          <a:prstGeom prst="rect">
+            <a:avLst/>
+          </a:prstGeom>
+        </p:spPr>
+      </p:pic>
+      <p:grpSp>
+        <p:nvGrpSpPr>
+          <p:cNvPr id="33" name="Group 32">
+            <a:extLst>
+              <a:ext uri="{FF2B5EF4-FFF2-40B4-BE49-F238E27FC236}">
+                <a16:creationId xmlns:a16="http://schemas.microsoft.com/office/drawing/2014/main" id="{DA604769-5EBD-FC03-D031-C5B760AC4600}"/>
+              </a:ext>
+            </a:extLst>
+          </p:cNvPr>
+          <p:cNvGrpSpPr/>
+          <p:nvPr/>
+        </p:nvGrpSpPr>
+        <p:grpSpPr>
+          <a:xfrm>
+            <a:off x="8068895" y="5443210"/>
+            <a:ext cx="2140370" cy="369332"/>
+            <a:chOff x="8014632" y="2386349"/>
+            <a:chExt cx="2140370" cy="369332"/>
+          </a:xfrm>
+        </p:grpSpPr>
+        <p:sp>
+          <p:nvSpPr>
+            <p:cNvPr id="34" name="TextBox 33">
+              <a:extLst>
+                <a:ext uri="{FF2B5EF4-FFF2-40B4-BE49-F238E27FC236}">
+                  <a16:creationId xmlns:a16="http://schemas.microsoft.com/office/drawing/2014/main" id="{8B2D38A6-98A2-7A6A-9467-7CD3ADA3A97C}"/>
+                </a:ext>
+              </a:extLst>
+            </p:cNvPr>
+            <p:cNvSpPr txBox="1"/>
+            <p:nvPr/>
+          </p:nvSpPr>
+          <p:spPr>
+            <a:xfrm>
+              <a:off x="8691651" y="2386349"/>
+              <a:ext cx="1463351" cy="369332"/>
+            </a:xfrm>
+            <a:prstGeom prst="rect">
+              <a:avLst/>
+            </a:prstGeom>
+            <a:noFill/>
+          </p:spPr>
+          <p:txBody>
+            <a:bodyPr wrap="square" rtlCol="0">
+              <a:spAutoFit/>
+            </a:bodyPr>
+            <a:lstStyle/>
+            <a:p>
+              <a:r>
+                <a:rPr lang="en-US" dirty="0">
+                  <a:solidFill>
+                    <a:srgbClr val="FFFF00"/>
+                  </a:solidFill>
+                </a:rPr>
+                <a:t>Input Data</a:t>
+              </a:r>
+            </a:p>
+          </p:txBody>
+        </p:sp>
+        <p:sp>
+          <p:nvSpPr>
+            <p:cNvPr id="35" name="Right Arrow 34">
+              <a:extLst>
+                <a:ext uri="{FF2B5EF4-FFF2-40B4-BE49-F238E27FC236}">
+                  <a16:creationId xmlns:a16="http://schemas.microsoft.com/office/drawing/2014/main" id="{E2974E18-E459-8C63-3B01-71DF30461245}"/>
+                </a:ext>
+              </a:extLst>
+            </p:cNvPr>
+            <p:cNvSpPr/>
+            <p:nvPr/>
+          </p:nvSpPr>
+          <p:spPr>
+            <a:xfrm>
+              <a:off x="8014632" y="2455257"/>
+              <a:ext cx="534109" cy="287729"/>
+            </a:xfrm>
+            <a:prstGeom prst="rightArrow">
+              <a:avLst/>
+            </a:prstGeom>
+          </p:spPr>
+          <p:style>
+            <a:lnRef idx="2">
+              <a:schemeClr val="accent1">
+                <a:shade val="15000"/>
+              </a:schemeClr>
+            </a:lnRef>
+            <a:fillRef idx="1">
+              <a:schemeClr val="accent1"/>
+            </a:fillRef>
+            <a:effectRef idx="0">
+              <a:schemeClr val="accent1"/>
+            </a:effectRef>
+            <a:fontRef idx="minor">
+              <a:schemeClr val="lt1"/>
+            </a:fontRef>
+          </p:style>
+          <p:txBody>
+            <a:bodyPr rtlCol="0" anchor="ctr"/>
+            <a:lstStyle/>
+            <a:p>
+              <a:pPr algn="ctr"/>
+              <a:endParaRPr lang="en-US" dirty="0"/>
+            </a:p>
+          </p:txBody>
+        </p:sp>
+      </p:grpSp>
+      <p:grpSp>
+        <p:nvGrpSpPr>
+          <p:cNvPr id="36" name="Group 35">
+            <a:extLst>
+              <a:ext uri="{FF2B5EF4-FFF2-40B4-BE49-F238E27FC236}">
+                <a16:creationId xmlns:a16="http://schemas.microsoft.com/office/drawing/2014/main" id="{7F48F30F-C67E-EE4F-DB1F-63A32A1C017C}"/>
+              </a:ext>
+            </a:extLst>
+          </p:cNvPr>
+          <p:cNvGrpSpPr/>
+          <p:nvPr/>
+        </p:nvGrpSpPr>
+        <p:grpSpPr>
+          <a:xfrm>
+            <a:off x="8068895" y="5990565"/>
+            <a:ext cx="2326173" cy="369332"/>
+            <a:chOff x="8014632" y="2933704"/>
+            <a:chExt cx="2326173" cy="369332"/>
+          </a:xfrm>
+        </p:grpSpPr>
+        <p:sp>
+          <p:nvSpPr>
+            <p:cNvPr id="37" name="TextBox 36">
+              <a:extLst>
+                <a:ext uri="{FF2B5EF4-FFF2-40B4-BE49-F238E27FC236}">
+                  <a16:creationId xmlns:a16="http://schemas.microsoft.com/office/drawing/2014/main" id="{31BA772A-5F37-E180-DDA2-17DF72D60181}"/>
+                </a:ext>
+              </a:extLst>
+            </p:cNvPr>
+            <p:cNvSpPr txBox="1"/>
+            <p:nvPr/>
+          </p:nvSpPr>
+          <p:spPr>
+            <a:xfrm>
+              <a:off x="8622203" y="2933704"/>
+              <a:ext cx="1718602" cy="369332"/>
+            </a:xfrm>
+            <a:prstGeom prst="rect">
+              <a:avLst/>
+            </a:prstGeom>
+            <a:noFill/>
+          </p:spPr>
+          <p:txBody>
+            <a:bodyPr wrap="square" rtlCol="0">
+              <a:spAutoFit/>
+            </a:bodyPr>
+            <a:lstStyle/>
+            <a:p>
+              <a:r>
+                <a:rPr lang="en-US" dirty="0">
+                  <a:solidFill>
+                    <a:srgbClr val="FFFF00"/>
+                  </a:solidFill>
+                </a:rPr>
+                <a:t>Output Data</a:t>
+              </a:r>
+            </a:p>
+          </p:txBody>
+        </p:sp>
+        <p:sp>
+          <p:nvSpPr>
+            <p:cNvPr id="38" name="Right Arrow 37">
+              <a:extLst>
+                <a:ext uri="{FF2B5EF4-FFF2-40B4-BE49-F238E27FC236}">
+                  <a16:creationId xmlns:a16="http://schemas.microsoft.com/office/drawing/2014/main" id="{429F0BBF-C761-9A69-15C8-AB6E54FC6031}"/>
+                </a:ext>
+              </a:extLst>
+            </p:cNvPr>
+            <p:cNvSpPr/>
+            <p:nvPr/>
+          </p:nvSpPr>
+          <p:spPr>
+            <a:xfrm>
+              <a:off x="8014632" y="2960027"/>
+              <a:ext cx="534109" cy="287729"/>
+            </a:xfrm>
+            <a:prstGeom prst="rightArrow">
+              <a:avLst/>
+            </a:prstGeom>
+          </p:spPr>
+          <p:style>
+            <a:lnRef idx="2">
+              <a:schemeClr val="accent1">
+                <a:shade val="15000"/>
+              </a:schemeClr>
+            </a:lnRef>
+            <a:fillRef idx="1">
+              <a:schemeClr val="accent1"/>
+            </a:fillRef>
+            <a:effectRef idx="0">
+              <a:schemeClr val="accent1"/>
+            </a:effectRef>
+            <a:fontRef idx="minor">
+              <a:schemeClr val="lt1"/>
+            </a:fontRef>
+          </p:style>
+          <p:txBody>
+            <a:bodyPr rtlCol="0" anchor="ctr"/>
+            <a:lstStyle/>
+            <a:p>
+              <a:pPr algn="ctr"/>
+              <a:endParaRPr lang="en-US" dirty="0"/>
+            </a:p>
+          </p:txBody>
+        </p:sp>
       </p:grpSp>
     </p:spTree>
     <p:extLst>
@@ -9036,10 +9799,10 @@
         </p:nvGrpSpPr>
         <p:grpSpPr>
           <a:xfrm>
-            <a:off x="94290" y="2016674"/>
-            <a:ext cx="10429720" cy="825713"/>
-            <a:chOff x="0" y="5929022"/>
-            <a:chExt cx="10429720" cy="825713"/>
+            <a:off x="0" y="1786794"/>
+            <a:ext cx="10429720" cy="1471953"/>
+            <a:chOff x="-94290" y="5928704"/>
+            <a:chExt cx="10429720" cy="1471953"/>
           </a:xfrm>
         </p:grpSpPr>
         <p:sp>
@@ -9056,7 +9819,7 @@
           </p:nvSpPr>
           <p:spPr>
             <a:xfrm>
-              <a:off x="0" y="5929022"/>
+              <a:off x="-94290" y="5928704"/>
               <a:ext cx="10429720" cy="369332"/>
             </a:xfrm>
             <a:prstGeom prst="rect">
@@ -9099,7 +9862,7 @@
           </p:blipFill>
           <p:spPr>
             <a:xfrm>
-              <a:off x="22185" y="6320326"/>
+              <a:off x="0" y="6966248"/>
               <a:ext cx="7772400" cy="434409"/>
             </a:xfrm>
             <a:prstGeom prst="rect">
@@ -9123,9 +9886,9 @@
         <p:grpSpPr>
           <a:xfrm>
             <a:off x="0" y="3405473"/>
-            <a:ext cx="12192000" cy="1041138"/>
+            <a:ext cx="12192000" cy="1589268"/>
             <a:chOff x="0" y="6505572"/>
-            <a:chExt cx="12192000" cy="1041138"/>
+            <a:chExt cx="12192000" cy="1589268"/>
           </a:xfrm>
         </p:grpSpPr>
         <p:sp>
@@ -9191,7 +9954,7 @@
           </p:blipFill>
           <p:spPr>
             <a:xfrm>
-              <a:off x="0" y="7151903"/>
+              <a:off x="94290" y="7700033"/>
               <a:ext cx="7866690" cy="394807"/>
             </a:xfrm>
             <a:prstGeom prst="rect">
@@ -9215,9 +9978,9 @@
         <p:grpSpPr>
           <a:xfrm>
             <a:off x="0" y="5071271"/>
-            <a:ext cx="11875625" cy="1041046"/>
+            <a:ext cx="11875625" cy="1665798"/>
             <a:chOff x="0" y="5408453"/>
-            <a:chExt cx="11875625" cy="1041046"/>
+            <a:chExt cx="11875625" cy="1665798"/>
           </a:xfrm>
         </p:grpSpPr>
         <p:sp>
@@ -9277,7 +10040,7 @@
           </p:blipFill>
           <p:spPr>
             <a:xfrm>
-              <a:off x="0" y="6054784"/>
+              <a:off x="94290" y="6679536"/>
               <a:ext cx="7772400" cy="394715"/>
             </a:xfrm>
             <a:prstGeom prst="rect">
@@ -9286,6 +10049,764 @@
           </p:spPr>
         </p:pic>
       </p:grpSp>
+      <p:pic>
+        <p:nvPicPr>
+          <p:cNvPr id="3" name="Picture 2">
+            <a:extLst>
+              <a:ext uri="{FF2B5EF4-FFF2-40B4-BE49-F238E27FC236}">
+                <a16:creationId xmlns:a16="http://schemas.microsoft.com/office/drawing/2014/main" id="{BA2A73D0-C6B6-0FD0-CF8E-CDCB60293F45}"/>
+              </a:ext>
+            </a:extLst>
+          </p:cNvPr>
+          <p:cNvPicPr>
+            <a:picLocks noChangeAspect="1"/>
+          </p:cNvPicPr>
+          <p:nvPr/>
+        </p:nvPicPr>
+        <p:blipFill>
+          <a:blip r:embed="rId6"/>
+          <a:stretch>
+            <a:fillRect/>
+          </a:stretch>
+        </p:blipFill>
+        <p:spPr>
+          <a:xfrm>
+            <a:off x="94290" y="2243203"/>
+            <a:ext cx="6164288" cy="450000"/>
+          </a:xfrm>
+          <a:prstGeom prst="rect">
+            <a:avLst/>
+          </a:prstGeom>
+        </p:spPr>
+      </p:pic>
+      <p:grpSp>
+        <p:nvGrpSpPr>
+          <p:cNvPr id="4" name="Group 3">
+            <a:extLst>
+              <a:ext uri="{FF2B5EF4-FFF2-40B4-BE49-F238E27FC236}">
+                <a16:creationId xmlns:a16="http://schemas.microsoft.com/office/drawing/2014/main" id="{6A92E007-5ECD-E979-CA2C-E6FF94905754}"/>
+              </a:ext>
+            </a:extLst>
+          </p:cNvPr>
+          <p:cNvGrpSpPr/>
+          <p:nvPr/>
+        </p:nvGrpSpPr>
+        <p:grpSpPr>
+          <a:xfrm>
+            <a:off x="6431924" y="2258270"/>
+            <a:ext cx="2140370" cy="369332"/>
+            <a:chOff x="8014632" y="2386349"/>
+            <a:chExt cx="2140370" cy="369332"/>
+          </a:xfrm>
+        </p:grpSpPr>
+        <p:sp>
+          <p:nvSpPr>
+            <p:cNvPr id="6" name="TextBox 5">
+              <a:extLst>
+                <a:ext uri="{FF2B5EF4-FFF2-40B4-BE49-F238E27FC236}">
+                  <a16:creationId xmlns:a16="http://schemas.microsoft.com/office/drawing/2014/main" id="{6B5714F0-D075-09D9-A67A-0796EBFA1C2E}"/>
+                </a:ext>
+              </a:extLst>
+            </p:cNvPr>
+            <p:cNvSpPr txBox="1"/>
+            <p:nvPr/>
+          </p:nvSpPr>
+          <p:spPr>
+            <a:xfrm>
+              <a:off x="8691651" y="2386349"/>
+              <a:ext cx="1463351" cy="369332"/>
+            </a:xfrm>
+            <a:prstGeom prst="rect">
+              <a:avLst/>
+            </a:prstGeom>
+            <a:noFill/>
+          </p:spPr>
+          <p:txBody>
+            <a:bodyPr wrap="square" rtlCol="0">
+              <a:spAutoFit/>
+            </a:bodyPr>
+            <a:lstStyle/>
+            <a:p>
+              <a:r>
+                <a:rPr lang="en-US" dirty="0">
+                  <a:solidFill>
+                    <a:srgbClr val="FFFF00"/>
+                  </a:solidFill>
+                </a:rPr>
+                <a:t>Input Data</a:t>
+              </a:r>
+            </a:p>
+          </p:txBody>
+        </p:sp>
+        <p:sp>
+          <p:nvSpPr>
+            <p:cNvPr id="7" name="Right Arrow 6">
+              <a:extLst>
+                <a:ext uri="{FF2B5EF4-FFF2-40B4-BE49-F238E27FC236}">
+                  <a16:creationId xmlns:a16="http://schemas.microsoft.com/office/drawing/2014/main" id="{45A03CED-FCE8-1908-D428-A778B21D42BD}"/>
+                </a:ext>
+              </a:extLst>
+            </p:cNvPr>
+            <p:cNvSpPr/>
+            <p:nvPr/>
+          </p:nvSpPr>
+          <p:spPr>
+            <a:xfrm>
+              <a:off x="8014632" y="2455257"/>
+              <a:ext cx="534109" cy="287729"/>
+            </a:xfrm>
+            <a:prstGeom prst="rightArrow">
+              <a:avLst/>
+            </a:prstGeom>
+          </p:spPr>
+          <p:style>
+            <a:lnRef idx="2">
+              <a:schemeClr val="accent1">
+                <a:shade val="15000"/>
+              </a:schemeClr>
+            </a:lnRef>
+            <a:fillRef idx="1">
+              <a:schemeClr val="accent1"/>
+            </a:fillRef>
+            <a:effectRef idx="0">
+              <a:schemeClr val="accent1"/>
+            </a:effectRef>
+            <a:fontRef idx="minor">
+              <a:schemeClr val="lt1"/>
+            </a:fontRef>
+          </p:style>
+          <p:txBody>
+            <a:bodyPr rtlCol="0" anchor="ctr"/>
+            <a:lstStyle/>
+            <a:p>
+              <a:pPr algn="ctr"/>
+              <a:endParaRPr lang="en-US" dirty="0"/>
+            </a:p>
+          </p:txBody>
+        </p:sp>
+      </p:grpSp>
+      <p:grpSp>
+        <p:nvGrpSpPr>
+          <p:cNvPr id="9" name="Group 8">
+            <a:extLst>
+              <a:ext uri="{FF2B5EF4-FFF2-40B4-BE49-F238E27FC236}">
+                <a16:creationId xmlns:a16="http://schemas.microsoft.com/office/drawing/2014/main" id="{EC2DCF74-D665-4081-0D34-8FF1E614E1F7}"/>
+              </a:ext>
+            </a:extLst>
+          </p:cNvPr>
+          <p:cNvGrpSpPr/>
+          <p:nvPr/>
+        </p:nvGrpSpPr>
+        <p:grpSpPr>
+          <a:xfrm>
+            <a:off x="7964723" y="2850525"/>
+            <a:ext cx="2326173" cy="369332"/>
+            <a:chOff x="8014632" y="2933704"/>
+            <a:chExt cx="2326173" cy="369332"/>
+          </a:xfrm>
+        </p:grpSpPr>
+        <p:sp>
+          <p:nvSpPr>
+            <p:cNvPr id="10" name="TextBox 9">
+              <a:extLst>
+                <a:ext uri="{FF2B5EF4-FFF2-40B4-BE49-F238E27FC236}">
+                  <a16:creationId xmlns:a16="http://schemas.microsoft.com/office/drawing/2014/main" id="{990EEC5D-A703-BB73-5C2E-37093186AA2C}"/>
+                </a:ext>
+              </a:extLst>
+            </p:cNvPr>
+            <p:cNvSpPr txBox="1"/>
+            <p:nvPr/>
+          </p:nvSpPr>
+          <p:spPr>
+            <a:xfrm>
+              <a:off x="8622203" y="2933704"/>
+              <a:ext cx="1718602" cy="369332"/>
+            </a:xfrm>
+            <a:prstGeom prst="rect">
+              <a:avLst/>
+            </a:prstGeom>
+            <a:noFill/>
+          </p:spPr>
+          <p:txBody>
+            <a:bodyPr wrap="square" rtlCol="0">
+              <a:spAutoFit/>
+            </a:bodyPr>
+            <a:lstStyle/>
+            <a:p>
+              <a:r>
+                <a:rPr lang="en-US" dirty="0">
+                  <a:solidFill>
+                    <a:srgbClr val="FFFF00"/>
+                  </a:solidFill>
+                </a:rPr>
+                <a:t>Output Data</a:t>
+              </a:r>
+            </a:p>
+          </p:txBody>
+        </p:sp>
+        <p:sp>
+          <p:nvSpPr>
+            <p:cNvPr id="11" name="Right Arrow 10">
+              <a:extLst>
+                <a:ext uri="{FF2B5EF4-FFF2-40B4-BE49-F238E27FC236}">
+                  <a16:creationId xmlns:a16="http://schemas.microsoft.com/office/drawing/2014/main" id="{631FC0ED-8034-4DF9-A5AC-43313C6B026E}"/>
+                </a:ext>
+              </a:extLst>
+            </p:cNvPr>
+            <p:cNvSpPr/>
+            <p:nvPr/>
+          </p:nvSpPr>
+          <p:spPr>
+            <a:xfrm>
+              <a:off x="8014632" y="2960027"/>
+              <a:ext cx="534109" cy="287729"/>
+            </a:xfrm>
+            <a:prstGeom prst="rightArrow">
+              <a:avLst/>
+            </a:prstGeom>
+          </p:spPr>
+          <p:style>
+            <a:lnRef idx="2">
+              <a:schemeClr val="accent1">
+                <a:shade val="15000"/>
+              </a:schemeClr>
+            </a:lnRef>
+            <a:fillRef idx="1">
+              <a:schemeClr val="accent1"/>
+            </a:fillRef>
+            <a:effectRef idx="0">
+              <a:schemeClr val="accent1"/>
+            </a:effectRef>
+            <a:fontRef idx="minor">
+              <a:schemeClr val="lt1"/>
+            </a:fontRef>
+          </p:style>
+          <p:txBody>
+            <a:bodyPr rtlCol="0" anchor="ctr"/>
+            <a:lstStyle/>
+            <a:p>
+              <a:pPr algn="ctr"/>
+              <a:endParaRPr lang="en-US" dirty="0"/>
+            </a:p>
+          </p:txBody>
+        </p:sp>
+      </p:grpSp>
+      <p:pic>
+        <p:nvPicPr>
+          <p:cNvPr id="12" name="Picture 11">
+            <a:extLst>
+              <a:ext uri="{FF2B5EF4-FFF2-40B4-BE49-F238E27FC236}">
+                <a16:creationId xmlns:a16="http://schemas.microsoft.com/office/drawing/2014/main" id="{E8019EE2-8884-29E6-0885-24C6461503F0}"/>
+              </a:ext>
+            </a:extLst>
+          </p:cNvPr>
+          <p:cNvPicPr>
+            <a:picLocks noChangeAspect="1"/>
+          </p:cNvPicPr>
+          <p:nvPr/>
+        </p:nvPicPr>
+        <p:blipFill>
+          <a:blip r:embed="rId7"/>
+          <a:stretch>
+            <a:fillRect/>
+          </a:stretch>
+        </p:blipFill>
+        <p:spPr>
+          <a:xfrm>
+            <a:off x="100139" y="4073106"/>
+            <a:ext cx="5819494" cy="450000"/>
+          </a:xfrm>
+          <a:prstGeom prst="rect">
+            <a:avLst/>
+          </a:prstGeom>
+        </p:spPr>
+      </p:pic>
+      <p:grpSp>
+        <p:nvGrpSpPr>
+          <p:cNvPr id="14" name="Group 13">
+            <a:extLst>
+              <a:ext uri="{FF2B5EF4-FFF2-40B4-BE49-F238E27FC236}">
+                <a16:creationId xmlns:a16="http://schemas.microsoft.com/office/drawing/2014/main" id="{3DADA1C0-3C7D-DBB4-BDA0-329E0718AC11}"/>
+              </a:ext>
+            </a:extLst>
+          </p:cNvPr>
+          <p:cNvGrpSpPr/>
+          <p:nvPr/>
+        </p:nvGrpSpPr>
+        <p:grpSpPr>
+          <a:xfrm>
+            <a:off x="6096000" y="4074264"/>
+            <a:ext cx="2140370" cy="369332"/>
+            <a:chOff x="8014632" y="2386349"/>
+            <a:chExt cx="2140370" cy="369332"/>
+          </a:xfrm>
+        </p:grpSpPr>
+        <p:sp>
+          <p:nvSpPr>
+            <p:cNvPr id="16" name="TextBox 15">
+              <a:extLst>
+                <a:ext uri="{FF2B5EF4-FFF2-40B4-BE49-F238E27FC236}">
+                  <a16:creationId xmlns:a16="http://schemas.microsoft.com/office/drawing/2014/main" id="{4CD8EE46-4421-382B-5A8B-350EBA9813BC}"/>
+                </a:ext>
+              </a:extLst>
+            </p:cNvPr>
+            <p:cNvSpPr txBox="1"/>
+            <p:nvPr/>
+          </p:nvSpPr>
+          <p:spPr>
+            <a:xfrm>
+              <a:off x="8691651" y="2386349"/>
+              <a:ext cx="1463351" cy="369332"/>
+            </a:xfrm>
+            <a:prstGeom prst="rect">
+              <a:avLst/>
+            </a:prstGeom>
+            <a:noFill/>
+          </p:spPr>
+          <p:txBody>
+            <a:bodyPr wrap="square" rtlCol="0">
+              <a:spAutoFit/>
+            </a:bodyPr>
+            <a:lstStyle/>
+            <a:p>
+              <a:r>
+                <a:rPr lang="en-US" dirty="0">
+                  <a:solidFill>
+                    <a:srgbClr val="FFFF00"/>
+                  </a:solidFill>
+                </a:rPr>
+                <a:t>Input Data</a:t>
+              </a:r>
+            </a:p>
+          </p:txBody>
+        </p:sp>
+        <p:sp>
+          <p:nvSpPr>
+            <p:cNvPr id="17" name="Right Arrow 16">
+              <a:extLst>
+                <a:ext uri="{FF2B5EF4-FFF2-40B4-BE49-F238E27FC236}">
+                  <a16:creationId xmlns:a16="http://schemas.microsoft.com/office/drawing/2014/main" id="{565AFCEA-F0CA-6F72-5462-FC28680E7CC1}"/>
+                </a:ext>
+              </a:extLst>
+            </p:cNvPr>
+            <p:cNvSpPr/>
+            <p:nvPr/>
+          </p:nvSpPr>
+          <p:spPr>
+            <a:xfrm>
+              <a:off x="8014632" y="2455257"/>
+              <a:ext cx="534109" cy="287729"/>
+            </a:xfrm>
+            <a:prstGeom prst="rightArrow">
+              <a:avLst/>
+            </a:prstGeom>
+          </p:spPr>
+          <p:style>
+            <a:lnRef idx="2">
+              <a:schemeClr val="accent1">
+                <a:shade val="15000"/>
+              </a:schemeClr>
+            </a:lnRef>
+            <a:fillRef idx="1">
+              <a:schemeClr val="accent1"/>
+            </a:fillRef>
+            <a:effectRef idx="0">
+              <a:schemeClr val="accent1"/>
+            </a:effectRef>
+            <a:fontRef idx="minor">
+              <a:schemeClr val="lt1"/>
+            </a:fontRef>
+          </p:style>
+          <p:txBody>
+            <a:bodyPr rtlCol="0" anchor="ctr"/>
+            <a:lstStyle/>
+            <a:p>
+              <a:pPr algn="ctr"/>
+              <a:endParaRPr lang="en-US" dirty="0"/>
+            </a:p>
+          </p:txBody>
+        </p:sp>
+      </p:grpSp>
+      <p:grpSp>
+        <p:nvGrpSpPr>
+          <p:cNvPr id="18" name="Group 17">
+            <a:extLst>
+              <a:ext uri="{FF2B5EF4-FFF2-40B4-BE49-F238E27FC236}">
+                <a16:creationId xmlns:a16="http://schemas.microsoft.com/office/drawing/2014/main" id="{2593398B-9A3A-3A26-5126-5846B0493D7E}"/>
+              </a:ext>
+            </a:extLst>
+          </p:cNvPr>
+          <p:cNvGrpSpPr/>
+          <p:nvPr/>
+        </p:nvGrpSpPr>
+        <p:grpSpPr>
+          <a:xfrm>
+            <a:off x="8019784" y="4579408"/>
+            <a:ext cx="2326173" cy="369332"/>
+            <a:chOff x="8014632" y="2933704"/>
+            <a:chExt cx="2326173" cy="369332"/>
+          </a:xfrm>
+        </p:grpSpPr>
+        <p:sp>
+          <p:nvSpPr>
+            <p:cNvPr id="19" name="TextBox 18">
+              <a:extLst>
+                <a:ext uri="{FF2B5EF4-FFF2-40B4-BE49-F238E27FC236}">
+                  <a16:creationId xmlns:a16="http://schemas.microsoft.com/office/drawing/2014/main" id="{4A1A1473-45DA-7213-9AAF-00C98A950EED}"/>
+                </a:ext>
+              </a:extLst>
+            </p:cNvPr>
+            <p:cNvSpPr txBox="1"/>
+            <p:nvPr/>
+          </p:nvSpPr>
+          <p:spPr>
+            <a:xfrm>
+              <a:off x="8622203" y="2933704"/>
+              <a:ext cx="1718602" cy="369332"/>
+            </a:xfrm>
+            <a:prstGeom prst="rect">
+              <a:avLst/>
+            </a:prstGeom>
+            <a:noFill/>
+          </p:spPr>
+          <p:txBody>
+            <a:bodyPr wrap="square" rtlCol="0">
+              <a:spAutoFit/>
+            </a:bodyPr>
+            <a:lstStyle/>
+            <a:p>
+              <a:r>
+                <a:rPr lang="en-US" dirty="0">
+                  <a:solidFill>
+                    <a:srgbClr val="FFFF00"/>
+                  </a:solidFill>
+                </a:rPr>
+                <a:t>Output Data</a:t>
+              </a:r>
+            </a:p>
+          </p:txBody>
+        </p:sp>
+        <p:sp>
+          <p:nvSpPr>
+            <p:cNvPr id="21" name="Right Arrow 20">
+              <a:extLst>
+                <a:ext uri="{FF2B5EF4-FFF2-40B4-BE49-F238E27FC236}">
+                  <a16:creationId xmlns:a16="http://schemas.microsoft.com/office/drawing/2014/main" id="{FC947630-928D-02DE-8748-124857593225}"/>
+                </a:ext>
+              </a:extLst>
+            </p:cNvPr>
+            <p:cNvSpPr/>
+            <p:nvPr/>
+          </p:nvSpPr>
+          <p:spPr>
+            <a:xfrm>
+              <a:off x="8014632" y="2960027"/>
+              <a:ext cx="534109" cy="287729"/>
+            </a:xfrm>
+            <a:prstGeom prst="rightArrow">
+              <a:avLst/>
+            </a:prstGeom>
+          </p:spPr>
+          <p:style>
+            <a:lnRef idx="2">
+              <a:schemeClr val="accent1">
+                <a:shade val="15000"/>
+              </a:schemeClr>
+            </a:lnRef>
+            <a:fillRef idx="1">
+              <a:schemeClr val="accent1"/>
+            </a:fillRef>
+            <a:effectRef idx="0">
+              <a:schemeClr val="accent1"/>
+            </a:effectRef>
+            <a:fontRef idx="minor">
+              <a:schemeClr val="lt1"/>
+            </a:fontRef>
+          </p:style>
+          <p:txBody>
+            <a:bodyPr rtlCol="0" anchor="ctr"/>
+            <a:lstStyle/>
+            <a:p>
+              <a:pPr algn="ctr"/>
+              <a:endParaRPr lang="en-US" dirty="0"/>
+            </a:p>
+          </p:txBody>
+        </p:sp>
+      </p:grpSp>
+      <p:pic>
+        <p:nvPicPr>
+          <p:cNvPr id="24" name="Picture 23">
+            <a:extLst>
+              <a:ext uri="{FF2B5EF4-FFF2-40B4-BE49-F238E27FC236}">
+                <a16:creationId xmlns:a16="http://schemas.microsoft.com/office/drawing/2014/main" id="{11E69F94-DDF7-FD2A-AE47-D31A3B3317A9}"/>
+              </a:ext>
+            </a:extLst>
+          </p:cNvPr>
+          <p:cNvPicPr>
+            <a:picLocks noChangeAspect="1"/>
+          </p:cNvPicPr>
+          <p:nvPr/>
+        </p:nvPicPr>
+        <p:blipFill>
+          <a:blip r:embed="rId8"/>
+          <a:stretch>
+            <a:fillRect/>
+          </a:stretch>
+        </p:blipFill>
+        <p:spPr>
+          <a:xfrm>
+            <a:off x="94290" y="5815767"/>
+            <a:ext cx="6300005" cy="450000"/>
+          </a:xfrm>
+          <a:prstGeom prst="rect">
+            <a:avLst/>
+          </a:prstGeom>
+        </p:spPr>
+      </p:pic>
+      <p:grpSp>
+        <p:nvGrpSpPr>
+          <p:cNvPr id="26" name="Group 25">
+            <a:extLst>
+              <a:ext uri="{FF2B5EF4-FFF2-40B4-BE49-F238E27FC236}">
+                <a16:creationId xmlns:a16="http://schemas.microsoft.com/office/drawing/2014/main" id="{46391756-DA2D-3393-4266-F4B64C260669}"/>
+              </a:ext>
+            </a:extLst>
+          </p:cNvPr>
+          <p:cNvGrpSpPr/>
+          <p:nvPr/>
+        </p:nvGrpSpPr>
+        <p:grpSpPr>
+          <a:xfrm>
+            <a:off x="6486985" y="5794132"/>
+            <a:ext cx="2140370" cy="369332"/>
+            <a:chOff x="8014632" y="2386349"/>
+            <a:chExt cx="2140370" cy="369332"/>
+          </a:xfrm>
+        </p:grpSpPr>
+        <p:sp>
+          <p:nvSpPr>
+            <p:cNvPr id="29" name="TextBox 28">
+              <a:extLst>
+                <a:ext uri="{FF2B5EF4-FFF2-40B4-BE49-F238E27FC236}">
+                  <a16:creationId xmlns:a16="http://schemas.microsoft.com/office/drawing/2014/main" id="{E3B82BAA-CE59-4156-C14A-BA988E205937}"/>
+                </a:ext>
+              </a:extLst>
+            </p:cNvPr>
+            <p:cNvSpPr txBox="1"/>
+            <p:nvPr/>
+          </p:nvSpPr>
+          <p:spPr>
+            <a:xfrm>
+              <a:off x="8691651" y="2386349"/>
+              <a:ext cx="1463351" cy="369332"/>
+            </a:xfrm>
+            <a:prstGeom prst="rect">
+              <a:avLst/>
+            </a:prstGeom>
+            <a:noFill/>
+          </p:spPr>
+          <p:txBody>
+            <a:bodyPr wrap="square" rtlCol="0">
+              <a:spAutoFit/>
+            </a:bodyPr>
+            <a:lstStyle/>
+            <a:p>
+              <a:r>
+                <a:rPr lang="en-US" dirty="0">
+                  <a:solidFill>
+                    <a:srgbClr val="FFFF00"/>
+                  </a:solidFill>
+                </a:rPr>
+                <a:t>Input Data</a:t>
+              </a:r>
+            </a:p>
+          </p:txBody>
+        </p:sp>
+        <p:sp>
+          <p:nvSpPr>
+            <p:cNvPr id="30" name="Right Arrow 29">
+              <a:extLst>
+                <a:ext uri="{FF2B5EF4-FFF2-40B4-BE49-F238E27FC236}">
+                  <a16:creationId xmlns:a16="http://schemas.microsoft.com/office/drawing/2014/main" id="{F8251B3B-891D-8E95-6B20-850F8CBC6A0E}"/>
+                </a:ext>
+              </a:extLst>
+            </p:cNvPr>
+            <p:cNvSpPr/>
+            <p:nvPr/>
+          </p:nvSpPr>
+          <p:spPr>
+            <a:xfrm>
+              <a:off x="8014632" y="2455257"/>
+              <a:ext cx="534109" cy="287729"/>
+            </a:xfrm>
+            <a:prstGeom prst="rightArrow">
+              <a:avLst/>
+            </a:prstGeom>
+          </p:spPr>
+          <p:style>
+            <a:lnRef idx="2">
+              <a:schemeClr val="accent1">
+                <a:shade val="15000"/>
+              </a:schemeClr>
+            </a:lnRef>
+            <a:fillRef idx="1">
+              <a:schemeClr val="accent1"/>
+            </a:fillRef>
+            <a:effectRef idx="0">
+              <a:schemeClr val="accent1"/>
+            </a:effectRef>
+            <a:fontRef idx="minor">
+              <a:schemeClr val="lt1"/>
+            </a:fontRef>
+          </p:style>
+          <p:txBody>
+            <a:bodyPr rtlCol="0" anchor="ctr"/>
+            <a:lstStyle/>
+            <a:p>
+              <a:pPr algn="ctr"/>
+              <a:endParaRPr lang="en-US" dirty="0"/>
+            </a:p>
+          </p:txBody>
+        </p:sp>
+      </p:grpSp>
+      <p:grpSp>
+        <p:nvGrpSpPr>
+          <p:cNvPr id="31" name="Group 30">
+            <a:extLst>
+              <a:ext uri="{FF2B5EF4-FFF2-40B4-BE49-F238E27FC236}">
+                <a16:creationId xmlns:a16="http://schemas.microsoft.com/office/drawing/2014/main" id="{ABFD1D80-761C-4721-2638-3B5D3C1A74E4}"/>
+              </a:ext>
+            </a:extLst>
+          </p:cNvPr>
+          <p:cNvGrpSpPr/>
+          <p:nvPr/>
+        </p:nvGrpSpPr>
+        <p:grpSpPr>
+          <a:xfrm>
+            <a:off x="8019784" y="6342354"/>
+            <a:ext cx="2326173" cy="369332"/>
+            <a:chOff x="8014632" y="2933704"/>
+            <a:chExt cx="2326173" cy="369332"/>
+          </a:xfrm>
+        </p:grpSpPr>
+        <p:sp>
+          <p:nvSpPr>
+            <p:cNvPr id="32" name="TextBox 31">
+              <a:extLst>
+                <a:ext uri="{FF2B5EF4-FFF2-40B4-BE49-F238E27FC236}">
+                  <a16:creationId xmlns:a16="http://schemas.microsoft.com/office/drawing/2014/main" id="{5D21EC6B-1499-C35B-9F43-F9FAA52737AA}"/>
+                </a:ext>
+              </a:extLst>
+            </p:cNvPr>
+            <p:cNvSpPr txBox="1"/>
+            <p:nvPr/>
+          </p:nvSpPr>
+          <p:spPr>
+            <a:xfrm>
+              <a:off x="8622203" y="2933704"/>
+              <a:ext cx="1718602" cy="369332"/>
+            </a:xfrm>
+            <a:prstGeom prst="rect">
+              <a:avLst/>
+            </a:prstGeom>
+            <a:noFill/>
+          </p:spPr>
+          <p:txBody>
+            <a:bodyPr wrap="square" rtlCol="0">
+              <a:spAutoFit/>
+            </a:bodyPr>
+            <a:lstStyle/>
+            <a:p>
+              <a:r>
+                <a:rPr lang="en-US" dirty="0">
+                  <a:solidFill>
+                    <a:srgbClr val="FFFF00"/>
+                  </a:solidFill>
+                </a:rPr>
+                <a:t>Output Data</a:t>
+              </a:r>
+            </a:p>
+          </p:txBody>
+        </p:sp>
+        <p:sp>
+          <p:nvSpPr>
+            <p:cNvPr id="33" name="Right Arrow 32">
+              <a:extLst>
+                <a:ext uri="{FF2B5EF4-FFF2-40B4-BE49-F238E27FC236}">
+                  <a16:creationId xmlns:a16="http://schemas.microsoft.com/office/drawing/2014/main" id="{DE115BA1-9584-F324-330B-2D947468D7DC}"/>
+                </a:ext>
+              </a:extLst>
+            </p:cNvPr>
+            <p:cNvSpPr/>
+            <p:nvPr/>
+          </p:nvSpPr>
+          <p:spPr>
+            <a:xfrm>
+              <a:off x="8014632" y="2960027"/>
+              <a:ext cx="534109" cy="287729"/>
+            </a:xfrm>
+            <a:prstGeom prst="rightArrow">
+              <a:avLst/>
+            </a:prstGeom>
+          </p:spPr>
+          <p:style>
+            <a:lnRef idx="2">
+              <a:schemeClr val="accent1">
+                <a:shade val="15000"/>
+              </a:schemeClr>
+            </a:lnRef>
+            <a:fillRef idx="1">
+              <a:schemeClr val="accent1"/>
+            </a:fillRef>
+            <a:effectRef idx="0">
+              <a:schemeClr val="accent1"/>
+            </a:effectRef>
+            <a:fontRef idx="minor">
+              <a:schemeClr val="lt1"/>
+            </a:fontRef>
+          </p:style>
+          <p:txBody>
+            <a:bodyPr rtlCol="0" anchor="ctr"/>
+            <a:lstStyle/>
+            <a:p>
+              <a:pPr algn="ctr"/>
+              <a:endParaRPr lang="en-US" dirty="0"/>
+            </a:p>
+          </p:txBody>
+        </p:sp>
+      </p:grpSp>
+      <p:sp>
+        <p:nvSpPr>
+          <p:cNvPr id="34" name="TextBox 33">
+            <a:extLst>
+              <a:ext uri="{FF2B5EF4-FFF2-40B4-BE49-F238E27FC236}">
+                <a16:creationId xmlns:a16="http://schemas.microsoft.com/office/drawing/2014/main" id="{115F0524-3359-81A0-8F71-01882363DE91}"/>
+              </a:ext>
+            </a:extLst>
+          </p:cNvPr>
+          <p:cNvSpPr txBox="1"/>
+          <p:nvPr/>
+        </p:nvSpPr>
+        <p:spPr>
+          <a:xfrm>
+            <a:off x="-821803" y="1157468"/>
+            <a:ext cx="184731" cy="369332"/>
+          </a:xfrm>
+          <a:prstGeom prst="rect">
+            <a:avLst/>
+          </a:prstGeom>
+          <a:noFill/>
+        </p:spPr>
+        <p:txBody>
+          <a:bodyPr wrap="none" rtlCol="0">
+            <a:spAutoFit/>
+          </a:bodyPr>
+          <a:lstStyle/>
+          <a:p>
+            <a:endParaRPr lang="en-US"/>
+          </a:p>
+        </p:txBody>
+      </p:sp>
     </p:spTree>
     <p:extLst>
       <p:ext uri="{BB962C8B-B14F-4D97-AF65-F5344CB8AC3E}">

</xml_diff>